<commit_message>
bee dressing like zorro
</commit_message>
<xml_diff>
--- a/docs/bee.pptx
+++ b/docs/bee.pptx
@@ -3200,29 +3200,125 @@
           </p:txBody>
         </p:sp>
       </p:grpSp>
+      <p:sp>
+        <p:nvSpPr>
+          <p:cNvPr id="28" name="Heart 27"/>
+          <p:cNvSpPr/>
+          <p:nvPr/>
+        </p:nvSpPr>
+        <p:spPr>
+          <a:xfrm rot="16200000">
+            <a:off x="6087342" y="3151009"/>
+            <a:ext cx="3353633" cy="847726"/>
+          </a:xfrm>
+          <a:prstGeom prst="heart">
+            <a:avLst/>
+          </a:prstGeom>
+          <a:solidFill>
+            <a:schemeClr val="bg1">
+              <a:lumMod val="85000"/>
+            </a:schemeClr>
+          </a:solidFill>
+          <a:ln>
+            <a:solidFill>
+              <a:schemeClr val="tx1"/>
+            </a:solidFill>
+          </a:ln>
+        </p:spPr>
+        <p:style>
+          <a:lnRef idx="1">
+            <a:schemeClr val="accent1"/>
+          </a:lnRef>
+          <a:fillRef idx="3">
+            <a:schemeClr val="accent1"/>
+          </a:fillRef>
+          <a:effectRef idx="2">
+            <a:schemeClr val="accent1"/>
+          </a:effectRef>
+          <a:fontRef idx="minor">
+            <a:schemeClr val="lt1"/>
+          </a:fontRef>
+        </p:style>
+        <p:txBody>
+          <a:bodyPr rtlCol="0" anchor="ctr"/>
+          <a:lstStyle/>
+          <a:p>
+            <a:pPr algn="ctr"/>
+            <a:endParaRPr lang="en-US"/>
+          </a:p>
+        </p:txBody>
+      </p:sp>
+      <p:sp>
+        <p:nvSpPr>
+          <p:cNvPr id="29" name="Heart 28"/>
+          <p:cNvSpPr/>
+          <p:nvPr/>
+        </p:nvSpPr>
+        <p:spPr>
+          <a:xfrm rot="5400000">
+            <a:off x="7218994" y="3022588"/>
+            <a:ext cx="3353633" cy="847726"/>
+          </a:xfrm>
+          <a:prstGeom prst="heart">
+            <a:avLst/>
+          </a:prstGeom>
+          <a:solidFill>
+            <a:schemeClr val="bg1">
+              <a:lumMod val="85000"/>
+            </a:schemeClr>
+          </a:solidFill>
+          <a:ln>
+            <a:solidFill>
+              <a:schemeClr val="tx1"/>
+            </a:solidFill>
+          </a:ln>
+        </p:spPr>
+        <p:style>
+          <a:lnRef idx="1">
+            <a:schemeClr val="accent1"/>
+          </a:lnRef>
+          <a:fillRef idx="3">
+            <a:schemeClr val="accent1"/>
+          </a:fillRef>
+          <a:effectRef idx="2">
+            <a:schemeClr val="accent1"/>
+          </a:effectRef>
+          <a:fontRef idx="minor">
+            <a:schemeClr val="lt1"/>
+          </a:fontRef>
+        </p:style>
+        <p:txBody>
+          <a:bodyPr rtlCol="0" anchor="ctr"/>
+          <a:lstStyle/>
+          <a:p>
+            <a:pPr algn="ctr"/>
+            <a:endParaRPr lang="en-US"/>
+          </a:p>
+        </p:txBody>
+      </p:sp>
       <p:grpSp>
         <p:nvGrpSpPr>
-          <p:cNvPr id="44" name="Group 43"/>
+          <p:cNvPr id="52" name="Group 51"/>
           <p:cNvGrpSpPr/>
           <p:nvPr/>
         </p:nvGrpSpPr>
         <p:grpSpPr>
           <a:xfrm>
-            <a:off x="2458463" y="1112976"/>
-            <a:ext cx="4062134" cy="3524423"/>
-            <a:chOff x="2458463" y="1112976"/>
-            <a:chExt cx="4062134" cy="3524423"/>
+            <a:off x="1764221" y="543881"/>
+            <a:ext cx="4694711" cy="4193402"/>
+            <a:chOff x="1764221" y="543881"/>
+            <a:chExt cx="4694711" cy="4193402"/>
           </a:xfrm>
         </p:grpSpPr>
         <p:sp>
           <p:nvSpPr>
-            <p:cNvPr id="31" name="Oval 30"/>
+            <p:cNvPr id="46" name="Oval 45"/>
             <p:cNvSpPr/>
             <p:nvPr/>
           </p:nvSpPr>
           <p:spPr>
-            <a:xfrm rot="13500000">
-              <a:off x="1868697" y="1921504"/>
+            <a:xfrm rot="9744064">
+              <a:off x="1764221" y="2501975"/>
               <a:ext cx="2587590" cy="1408058"/>
             </a:xfrm>
             <a:prstGeom prst="ellipse">
@@ -3264,13 +3360,13 @@
         </p:sp>
         <p:sp>
           <p:nvSpPr>
-            <p:cNvPr id="30" name="Oval 29"/>
+            <p:cNvPr id="45" name="Oval 44"/>
             <p:cNvSpPr/>
             <p:nvPr/>
           </p:nvSpPr>
           <p:spPr>
-            <a:xfrm rot="19557535">
-              <a:off x="3933007" y="1873540"/>
+            <a:xfrm rot="305525">
+              <a:off x="3871342" y="2525355"/>
               <a:ext cx="2587590" cy="1408058"/>
             </a:xfrm>
             <a:prstGeom prst="ellipse">
@@ -3310,70 +3406,645 @@
             </a:p>
           </p:txBody>
         </p:sp>
+        <p:grpSp>
+          <p:nvGrpSpPr>
+            <p:cNvPr id="44" name="Group 43"/>
+            <p:cNvGrpSpPr/>
+            <p:nvPr/>
+          </p:nvGrpSpPr>
+          <p:grpSpPr>
+            <a:xfrm>
+              <a:off x="2344297" y="1212860"/>
+              <a:ext cx="4062134" cy="3524423"/>
+              <a:chOff x="2458463" y="1112976"/>
+              <a:chExt cx="4062134" cy="3524423"/>
+            </a:xfrm>
+          </p:grpSpPr>
+          <p:sp>
+            <p:nvSpPr>
+              <p:cNvPr id="31" name="Oval 30"/>
+              <p:cNvSpPr/>
+              <p:nvPr/>
+            </p:nvSpPr>
+            <p:spPr>
+              <a:xfrm rot="13500000">
+                <a:off x="1868697" y="1921504"/>
+                <a:ext cx="2587590" cy="1408058"/>
+              </a:xfrm>
+              <a:prstGeom prst="ellipse">
+                <a:avLst/>
+              </a:prstGeom>
+              <a:solidFill>
+                <a:schemeClr val="bg1">
+                  <a:lumMod val="85000"/>
+                </a:schemeClr>
+              </a:solidFill>
+              <a:ln>
+                <a:solidFill>
+                  <a:srgbClr val="000000"/>
+                </a:solidFill>
+              </a:ln>
+            </p:spPr>
+            <p:style>
+              <a:lnRef idx="1">
+                <a:schemeClr val="accent1"/>
+              </a:lnRef>
+              <a:fillRef idx="3">
+                <a:schemeClr val="accent1"/>
+              </a:fillRef>
+              <a:effectRef idx="2">
+                <a:schemeClr val="accent1"/>
+              </a:effectRef>
+              <a:fontRef idx="minor">
+                <a:schemeClr val="lt1"/>
+              </a:fontRef>
+            </p:style>
+            <p:txBody>
+              <a:bodyPr rtlCol="0" anchor="ctr"/>
+              <a:lstStyle/>
+              <a:p>
+                <a:pPr algn="ctr"/>
+                <a:endParaRPr lang="en-US"/>
+              </a:p>
+            </p:txBody>
+          </p:sp>
+          <p:sp>
+            <p:nvSpPr>
+              <p:cNvPr id="30" name="Oval 29"/>
+              <p:cNvSpPr/>
+              <p:nvPr/>
+            </p:nvSpPr>
+            <p:spPr>
+              <a:xfrm rot="19557535">
+                <a:off x="3933007" y="1873540"/>
+                <a:ext cx="2587590" cy="1408058"/>
+              </a:xfrm>
+              <a:prstGeom prst="ellipse">
+                <a:avLst/>
+              </a:prstGeom>
+              <a:solidFill>
+                <a:schemeClr val="bg1">
+                  <a:lumMod val="85000"/>
+                </a:schemeClr>
+              </a:solidFill>
+              <a:ln>
+                <a:solidFill>
+                  <a:srgbClr val="000000"/>
+                </a:solidFill>
+              </a:ln>
+            </p:spPr>
+            <p:style>
+              <a:lnRef idx="1">
+                <a:schemeClr val="accent1"/>
+              </a:lnRef>
+              <a:fillRef idx="3">
+                <a:schemeClr val="accent1"/>
+              </a:fillRef>
+              <a:effectRef idx="2">
+                <a:schemeClr val="accent1"/>
+              </a:effectRef>
+              <a:fontRef idx="minor">
+                <a:schemeClr val="lt1"/>
+              </a:fontRef>
+            </p:style>
+            <p:txBody>
+              <a:bodyPr rtlCol="0" anchor="ctr"/>
+              <a:lstStyle/>
+              <a:p>
+                <a:pPr algn="ctr"/>
+                <a:endParaRPr lang="en-US"/>
+              </a:p>
+            </p:txBody>
+          </p:sp>
+          <p:sp>
+            <p:nvSpPr>
+              <p:cNvPr id="4" name="Oval 3"/>
+              <p:cNvSpPr/>
+              <p:nvPr/>
+            </p:nvSpPr>
+            <p:spPr>
+              <a:xfrm>
+                <a:off x="3168112" y="2054725"/>
+                <a:ext cx="1812389" cy="2225952"/>
+              </a:xfrm>
+              <a:prstGeom prst="ellipse">
+                <a:avLst/>
+              </a:prstGeom>
+              <a:solidFill>
+                <a:srgbClr val="E8C50E"/>
+              </a:solidFill>
+              <a:ln w="152400">
+                <a:solidFill>
+                  <a:schemeClr val="tx1"/>
+                </a:solidFill>
+              </a:ln>
+            </p:spPr>
+            <p:style>
+              <a:lnRef idx="1">
+                <a:schemeClr val="accent1"/>
+              </a:lnRef>
+              <a:fillRef idx="3">
+                <a:schemeClr val="accent1"/>
+              </a:fillRef>
+              <a:effectRef idx="2">
+                <a:schemeClr val="accent1"/>
+              </a:effectRef>
+              <a:fontRef idx="minor">
+                <a:schemeClr val="lt1"/>
+              </a:fontRef>
+            </p:style>
+            <p:txBody>
+              <a:bodyPr rtlCol="0" anchor="ctr"/>
+              <a:lstStyle/>
+              <a:p>
+                <a:pPr algn="ctr"/>
+                <a:endParaRPr lang="en-US"/>
+              </a:p>
+            </p:txBody>
+          </p:sp>
+          <p:sp>
+            <p:nvSpPr>
+              <p:cNvPr id="9" name="Smiley Face 8"/>
+              <p:cNvSpPr/>
+              <p:nvPr/>
+            </p:nvSpPr>
+            <p:spPr>
+              <a:xfrm>
+                <a:off x="3239467" y="1112976"/>
+                <a:ext cx="1598328" cy="1324731"/>
+              </a:xfrm>
+              <a:prstGeom prst="smileyFace">
+                <a:avLst/>
+              </a:prstGeom>
+              <a:solidFill>
+                <a:srgbClr val="E8C50E"/>
+              </a:solidFill>
+              <a:ln w="76200">
+                <a:solidFill>
+                  <a:srgbClr val="000000"/>
+                </a:solidFill>
+              </a:ln>
+            </p:spPr>
+            <p:style>
+              <a:lnRef idx="1">
+                <a:schemeClr val="accent1"/>
+              </a:lnRef>
+              <a:fillRef idx="3">
+                <a:schemeClr val="accent1"/>
+              </a:fillRef>
+              <a:effectRef idx="2">
+                <a:schemeClr val="accent1"/>
+              </a:effectRef>
+              <a:fontRef idx="minor">
+                <a:schemeClr val="lt1"/>
+              </a:fontRef>
+            </p:style>
+            <p:txBody>
+              <a:bodyPr rtlCol="0" anchor="ctr"/>
+              <a:lstStyle/>
+              <a:p>
+                <a:pPr algn="ctr"/>
+                <a:endParaRPr lang="en-US"/>
+              </a:p>
+            </p:txBody>
+          </p:sp>
+          <p:sp>
+            <p:nvSpPr>
+              <p:cNvPr id="10" name="Block Arc 9"/>
+              <p:cNvSpPr/>
+              <p:nvPr/>
+            </p:nvSpPr>
+            <p:spPr>
+              <a:xfrm flipV="1">
+                <a:off x="3282280" y="2168875"/>
+                <a:ext cx="1598328" cy="704033"/>
+              </a:xfrm>
+              <a:prstGeom prst="blockArc">
+                <a:avLst/>
+              </a:prstGeom>
+              <a:solidFill>
+                <a:schemeClr val="tx1"/>
+              </a:solidFill>
+              <a:ln>
+                <a:noFill/>
+              </a:ln>
+            </p:spPr>
+            <p:style>
+              <a:lnRef idx="1">
+                <a:schemeClr val="accent1"/>
+              </a:lnRef>
+              <a:fillRef idx="3">
+                <a:schemeClr val="accent1"/>
+              </a:fillRef>
+              <a:effectRef idx="2">
+                <a:schemeClr val="accent1"/>
+              </a:effectRef>
+              <a:fontRef idx="minor">
+                <a:schemeClr val="lt1"/>
+              </a:fontRef>
+            </p:style>
+            <p:txBody>
+              <a:bodyPr rtlCol="0" anchor="ctr"/>
+              <a:lstStyle/>
+              <a:p>
+                <a:pPr algn="ctr"/>
+                <a:endParaRPr lang="en-US">
+                  <a:solidFill>
+                    <a:schemeClr val="tx1"/>
+                  </a:solidFill>
+                </a:endParaRPr>
+              </a:p>
+            </p:txBody>
+          </p:sp>
+          <p:sp>
+            <p:nvSpPr>
+              <p:cNvPr id="11" name="Block Arc 10"/>
+              <p:cNvSpPr/>
+              <p:nvPr/>
+            </p:nvSpPr>
+            <p:spPr>
+              <a:xfrm flipV="1">
+                <a:off x="3111030" y="2677991"/>
+                <a:ext cx="1936249" cy="704033"/>
+              </a:xfrm>
+              <a:prstGeom prst="blockArc">
+                <a:avLst>
+                  <a:gd name="adj1" fmla="val 10800000"/>
+                  <a:gd name="adj2" fmla="val 21542399"/>
+                  <a:gd name="adj3" fmla="val 24983"/>
+                </a:avLst>
+              </a:prstGeom>
+              <a:solidFill>
+                <a:schemeClr val="tx1"/>
+              </a:solidFill>
+              <a:ln>
+                <a:noFill/>
+              </a:ln>
+            </p:spPr>
+            <p:style>
+              <a:lnRef idx="1">
+                <a:schemeClr val="accent1"/>
+              </a:lnRef>
+              <a:fillRef idx="3">
+                <a:schemeClr val="accent1"/>
+              </a:fillRef>
+              <a:effectRef idx="2">
+                <a:schemeClr val="accent1"/>
+              </a:effectRef>
+              <a:fontRef idx="minor">
+                <a:schemeClr val="lt1"/>
+              </a:fontRef>
+            </p:style>
+            <p:txBody>
+              <a:bodyPr rtlCol="0" anchor="ctr"/>
+              <a:lstStyle/>
+              <a:p>
+                <a:pPr algn="ctr"/>
+                <a:endParaRPr lang="en-US">
+                  <a:solidFill>
+                    <a:schemeClr val="tx1"/>
+                  </a:solidFill>
+                </a:endParaRPr>
+              </a:p>
+            </p:txBody>
+          </p:sp>
+          <p:sp>
+            <p:nvSpPr>
+              <p:cNvPr id="12" name="Block Arc 11"/>
+              <p:cNvSpPr/>
+              <p:nvPr/>
+            </p:nvSpPr>
+            <p:spPr>
+              <a:xfrm flipV="1">
+                <a:off x="3125301" y="3163142"/>
+                <a:ext cx="1893436" cy="704033"/>
+              </a:xfrm>
+              <a:prstGeom prst="blockArc">
+                <a:avLst/>
+              </a:prstGeom>
+              <a:solidFill>
+                <a:schemeClr val="tx1"/>
+              </a:solidFill>
+              <a:ln>
+                <a:noFill/>
+              </a:ln>
+            </p:spPr>
+            <p:style>
+              <a:lnRef idx="1">
+                <a:schemeClr val="accent1"/>
+              </a:lnRef>
+              <a:fillRef idx="3">
+                <a:schemeClr val="accent1"/>
+              </a:fillRef>
+              <a:effectRef idx="2">
+                <a:schemeClr val="accent1"/>
+              </a:effectRef>
+              <a:fontRef idx="minor">
+                <a:schemeClr val="lt1"/>
+              </a:fontRef>
+            </p:style>
+            <p:txBody>
+              <a:bodyPr rtlCol="0" anchor="ctr"/>
+              <a:lstStyle/>
+              <a:p>
+                <a:pPr algn="ctr"/>
+                <a:endParaRPr lang="en-US">
+                  <a:solidFill>
+                    <a:schemeClr val="tx1"/>
+                  </a:solidFill>
+                </a:endParaRPr>
+              </a:p>
+            </p:txBody>
+          </p:sp>
+          <p:sp>
+            <p:nvSpPr>
+              <p:cNvPr id="17" name="Isosceles Triangle 16"/>
+              <p:cNvSpPr/>
+              <p:nvPr/>
+            </p:nvSpPr>
+            <p:spPr>
+              <a:xfrm rot="10800000">
+                <a:off x="3924464" y="4280677"/>
+                <a:ext cx="328227" cy="356722"/>
+              </a:xfrm>
+              <a:prstGeom prst="triangle">
+                <a:avLst/>
+              </a:prstGeom>
+              <a:solidFill>
+                <a:srgbClr val="000000"/>
+              </a:solidFill>
+              <a:ln>
+                <a:noFill/>
+              </a:ln>
+            </p:spPr>
+            <p:style>
+              <a:lnRef idx="1">
+                <a:schemeClr val="accent1"/>
+              </a:lnRef>
+              <a:fillRef idx="3">
+                <a:schemeClr val="accent1"/>
+              </a:fillRef>
+              <a:effectRef idx="2">
+                <a:schemeClr val="accent1"/>
+              </a:effectRef>
+              <a:fontRef idx="minor">
+                <a:schemeClr val="lt1"/>
+              </a:fontRef>
+            </p:style>
+            <p:txBody>
+              <a:bodyPr rtlCol="0" anchor="ctr"/>
+              <a:lstStyle/>
+              <a:p>
+                <a:pPr algn="ctr"/>
+                <a:endParaRPr lang="en-US"/>
+              </a:p>
+            </p:txBody>
+          </p:sp>
+          <p:sp>
+            <p:nvSpPr>
+              <p:cNvPr id="21" name="Trapezoid 20"/>
+              <p:cNvSpPr/>
+              <p:nvPr/>
+            </p:nvSpPr>
+            <p:spPr>
+              <a:xfrm>
+                <a:off x="3239467" y="1269933"/>
+                <a:ext cx="1598328" cy="456606"/>
+              </a:xfrm>
+              <a:prstGeom prst="trapezoid">
+                <a:avLst>
+                  <a:gd name="adj" fmla="val 50003"/>
+                </a:avLst>
+              </a:prstGeom>
+              <a:solidFill>
+                <a:srgbClr val="000000"/>
+              </a:solidFill>
+              <a:ln>
+                <a:noFill/>
+              </a:ln>
+            </p:spPr>
+            <p:style>
+              <a:lnRef idx="1">
+                <a:schemeClr val="accent1"/>
+              </a:lnRef>
+              <a:fillRef idx="3">
+                <a:schemeClr val="accent1"/>
+              </a:fillRef>
+              <a:effectRef idx="2">
+                <a:schemeClr val="accent1"/>
+              </a:effectRef>
+              <a:fontRef idx="minor">
+                <a:schemeClr val="lt1"/>
+              </a:fontRef>
+            </p:style>
+            <p:txBody>
+              <a:bodyPr rtlCol="0" anchor="ctr"/>
+              <a:lstStyle/>
+              <a:p>
+                <a:pPr algn="ctr"/>
+                <a:endParaRPr lang="en-US"/>
+              </a:p>
+            </p:txBody>
+          </p:sp>
+          <p:sp>
+            <p:nvSpPr>
+              <p:cNvPr id="24" name="Oval 23"/>
+              <p:cNvSpPr/>
+              <p:nvPr/>
+            </p:nvSpPr>
+            <p:spPr>
+              <a:xfrm>
+                <a:off x="3524882" y="1269933"/>
+                <a:ext cx="456665" cy="513681"/>
+              </a:xfrm>
+              <a:prstGeom prst="ellipse">
+                <a:avLst/>
+              </a:prstGeom>
+              <a:solidFill>
+                <a:schemeClr val="bg1"/>
+              </a:solidFill>
+              <a:ln w="76200">
+                <a:solidFill>
+                  <a:schemeClr val="tx1"/>
+                </a:solidFill>
+              </a:ln>
+            </p:spPr>
+            <p:style>
+              <a:lnRef idx="1">
+                <a:schemeClr val="accent1"/>
+              </a:lnRef>
+              <a:fillRef idx="3">
+                <a:schemeClr val="accent1"/>
+              </a:fillRef>
+              <a:effectRef idx="2">
+                <a:schemeClr val="accent1"/>
+              </a:effectRef>
+              <a:fontRef idx="minor">
+                <a:schemeClr val="lt1"/>
+              </a:fontRef>
+            </p:style>
+            <p:txBody>
+              <a:bodyPr rtlCol="0" anchor="ctr"/>
+              <a:lstStyle/>
+              <a:p>
+                <a:pPr algn="ctr"/>
+                <a:endParaRPr lang="en-US"/>
+              </a:p>
+            </p:txBody>
+          </p:sp>
+          <p:sp>
+            <p:nvSpPr>
+              <p:cNvPr id="25" name="Oval 24"/>
+              <p:cNvSpPr/>
+              <p:nvPr/>
+            </p:nvSpPr>
+            <p:spPr>
+              <a:xfrm>
+                <a:off x="3620198" y="1422333"/>
+                <a:ext cx="304265" cy="361281"/>
+              </a:xfrm>
+              <a:prstGeom prst="ellipse">
+                <a:avLst/>
+              </a:prstGeom>
+              <a:solidFill>
+                <a:schemeClr val="tx1"/>
+              </a:solidFill>
+              <a:ln w="76200">
+                <a:noFill/>
+              </a:ln>
+            </p:spPr>
+            <p:style>
+              <a:lnRef idx="1">
+                <a:schemeClr val="accent1"/>
+              </a:lnRef>
+              <a:fillRef idx="3">
+                <a:schemeClr val="accent1"/>
+              </a:fillRef>
+              <a:effectRef idx="2">
+                <a:schemeClr val="accent1"/>
+              </a:effectRef>
+              <a:fontRef idx="minor">
+                <a:schemeClr val="lt1"/>
+              </a:fontRef>
+            </p:style>
+            <p:txBody>
+              <a:bodyPr rtlCol="0" anchor="ctr"/>
+              <a:lstStyle/>
+              <a:p>
+                <a:pPr algn="ctr"/>
+                <a:endParaRPr lang="en-US"/>
+              </a:p>
+            </p:txBody>
+          </p:sp>
+          <p:sp>
+            <p:nvSpPr>
+              <p:cNvPr id="26" name="Oval 25"/>
+              <p:cNvSpPr/>
+              <p:nvPr/>
+            </p:nvSpPr>
+            <p:spPr>
+              <a:xfrm>
+                <a:off x="4118504" y="1269933"/>
+                <a:ext cx="456665" cy="513681"/>
+              </a:xfrm>
+              <a:prstGeom prst="ellipse">
+                <a:avLst/>
+              </a:prstGeom>
+              <a:solidFill>
+                <a:schemeClr val="bg1"/>
+              </a:solidFill>
+              <a:ln w="76200">
+                <a:solidFill>
+                  <a:schemeClr val="tx1"/>
+                </a:solidFill>
+              </a:ln>
+            </p:spPr>
+            <p:style>
+              <a:lnRef idx="1">
+                <a:schemeClr val="accent1"/>
+              </a:lnRef>
+              <a:fillRef idx="3">
+                <a:schemeClr val="accent1"/>
+              </a:fillRef>
+              <a:effectRef idx="2">
+                <a:schemeClr val="accent1"/>
+              </a:effectRef>
+              <a:fontRef idx="minor">
+                <a:schemeClr val="lt1"/>
+              </a:fontRef>
+            </p:style>
+            <p:txBody>
+              <a:bodyPr rtlCol="0" anchor="ctr"/>
+              <a:lstStyle/>
+              <a:p>
+                <a:pPr algn="ctr"/>
+                <a:endParaRPr lang="en-US"/>
+              </a:p>
+            </p:txBody>
+          </p:sp>
+          <p:sp>
+            <p:nvSpPr>
+              <p:cNvPr id="27" name="Oval 26"/>
+              <p:cNvSpPr/>
+              <p:nvPr/>
+            </p:nvSpPr>
+            <p:spPr>
+              <a:xfrm>
+                <a:off x="4213820" y="1422333"/>
+                <a:ext cx="304265" cy="361281"/>
+              </a:xfrm>
+              <a:prstGeom prst="ellipse">
+                <a:avLst/>
+              </a:prstGeom>
+              <a:solidFill>
+                <a:schemeClr val="tx1"/>
+              </a:solidFill>
+              <a:ln w="76200">
+                <a:noFill/>
+              </a:ln>
+            </p:spPr>
+            <p:style>
+              <a:lnRef idx="1">
+                <a:schemeClr val="accent1"/>
+              </a:lnRef>
+              <a:fillRef idx="3">
+                <a:schemeClr val="accent1"/>
+              </a:fillRef>
+              <a:effectRef idx="2">
+                <a:schemeClr val="accent1"/>
+              </a:effectRef>
+              <a:fontRef idx="minor">
+                <a:schemeClr val="lt1"/>
+              </a:fontRef>
+            </p:style>
+            <p:txBody>
+              <a:bodyPr rtlCol="0" anchor="ctr"/>
+              <a:lstStyle/>
+              <a:p>
+                <a:pPr algn="ctr"/>
+                <a:endParaRPr lang="en-US"/>
+              </a:p>
+            </p:txBody>
+          </p:sp>
+        </p:grpSp>
         <p:sp>
           <p:nvSpPr>
-            <p:cNvPr id="4" name="Oval 3"/>
+            <p:cNvPr id="47" name="Can 46"/>
             <p:cNvSpPr/>
             <p:nvPr/>
           </p:nvSpPr>
           <p:spPr>
-            <a:xfrm>
-              <a:off x="3168112" y="2054725"/>
-              <a:ext cx="1812389" cy="2225952"/>
+            <a:xfrm rot="21159845">
+              <a:off x="3268008" y="927479"/>
+              <a:ext cx="1078828" cy="452047"/>
             </a:xfrm>
-            <a:prstGeom prst="ellipse">
+            <a:prstGeom prst="can">
               <a:avLst/>
             </a:prstGeom>
             <a:solidFill>
-              <a:srgbClr val="E8C50E"/>
+              <a:schemeClr val="tx1"/>
             </a:solidFill>
-            <a:ln w="152400">
-              <a:solidFill>
-                <a:schemeClr val="tx1"/>
-              </a:solidFill>
-            </a:ln>
-          </p:spPr>
-          <p:style>
-            <a:lnRef idx="1">
-              <a:schemeClr val="accent1"/>
-            </a:lnRef>
-            <a:fillRef idx="3">
-              <a:schemeClr val="accent1"/>
-            </a:fillRef>
-            <a:effectRef idx="2">
-              <a:schemeClr val="accent1"/>
-            </a:effectRef>
-            <a:fontRef idx="minor">
-              <a:schemeClr val="lt1"/>
-            </a:fontRef>
-          </p:style>
-          <p:txBody>
-            <a:bodyPr rtlCol="0" anchor="ctr"/>
-            <a:lstStyle/>
-            <a:p>
-              <a:pPr algn="ctr"/>
-              <a:endParaRPr lang="en-US"/>
-            </a:p>
-          </p:txBody>
-        </p:sp>
-        <p:sp>
-          <p:nvSpPr>
-            <p:cNvPr id="9" name="Smiley Face 8"/>
-            <p:cNvSpPr/>
-            <p:nvPr/>
-          </p:nvSpPr>
-          <p:spPr>
-            <a:xfrm>
-              <a:off x="3239467" y="1112976"/>
-              <a:ext cx="1598328" cy="1324731"/>
-            </a:xfrm>
-            <a:prstGeom prst="smileyFace">
-              <a:avLst/>
-            </a:prstGeom>
-            <a:solidFill>
-              <a:srgbClr val="E8C50E"/>
-            </a:solidFill>
-            <a:ln w="76200">
+            <a:ln>
               <a:solidFill>
                 <a:srgbClr val="000000"/>
               </a:solidFill>
@@ -3402,521 +4073,78 @@
             </a:p>
           </p:txBody>
         </p:sp>
-        <p:sp>
-          <p:nvSpPr>
-            <p:cNvPr id="10" name="Block Arc 9"/>
-            <p:cNvSpPr/>
+        <p:cxnSp>
+          <p:nvCxnSpPr>
+            <p:cNvPr id="49" name="Straight Connector 48"/>
+            <p:cNvCxnSpPr/>
             <p:nvPr/>
-          </p:nvSpPr>
+          </p:nvCxnSpPr>
           <p:spPr>
             <a:xfrm flipV="1">
-              <a:off x="3282280" y="2168875"/>
-              <a:ext cx="1598328" cy="704033"/>
+              <a:off x="3053946" y="1212860"/>
+              <a:ext cx="1669683" cy="290768"/>
             </a:xfrm>
-            <a:prstGeom prst="blockArc">
+            <a:prstGeom prst="line">
               <a:avLst/>
             </a:prstGeom>
-            <a:solidFill>
-              <a:schemeClr val="tx1"/>
-            </a:solidFill>
-            <a:ln>
-              <a:noFill/>
-            </a:ln>
-          </p:spPr>
-          <p:style>
-            <a:lnRef idx="1">
-              <a:schemeClr val="accent1"/>
-            </a:lnRef>
-            <a:fillRef idx="3">
-              <a:schemeClr val="accent1"/>
-            </a:fillRef>
-            <a:effectRef idx="2">
-              <a:schemeClr val="accent1"/>
-            </a:effectRef>
-            <a:fontRef idx="minor">
-              <a:schemeClr val="lt1"/>
-            </a:fontRef>
-          </p:style>
-          <p:txBody>
-            <a:bodyPr rtlCol="0" anchor="ctr"/>
-            <a:lstStyle/>
-            <a:p>
-              <a:pPr algn="ctr"/>
-              <a:endParaRPr lang="en-US">
-                <a:solidFill>
-                  <a:schemeClr val="tx1"/>
-                </a:solidFill>
-              </a:endParaRPr>
-            </a:p>
-          </p:txBody>
-        </p:sp>
-        <p:sp>
-          <p:nvSpPr>
-            <p:cNvPr id="11" name="Block Arc 10"/>
-            <p:cNvSpPr/>
-            <p:nvPr/>
-          </p:nvSpPr>
-          <p:spPr>
-            <a:xfrm flipV="1">
-              <a:off x="3111030" y="2677991"/>
-              <a:ext cx="1936249" cy="704033"/>
-            </a:xfrm>
-            <a:prstGeom prst="blockArc">
-              <a:avLst>
-                <a:gd name="adj1" fmla="val 10800000"/>
-                <a:gd name="adj2" fmla="val 21542399"/>
-                <a:gd name="adj3" fmla="val 24983"/>
-              </a:avLst>
-            </a:prstGeom>
-            <a:solidFill>
-              <a:schemeClr val="tx1"/>
-            </a:solidFill>
-            <a:ln>
-              <a:noFill/>
-            </a:ln>
-          </p:spPr>
-          <p:style>
-            <a:lnRef idx="1">
-              <a:schemeClr val="accent1"/>
-            </a:lnRef>
-            <a:fillRef idx="3">
-              <a:schemeClr val="accent1"/>
-            </a:fillRef>
-            <a:effectRef idx="2">
-              <a:schemeClr val="accent1"/>
-            </a:effectRef>
-            <a:fontRef idx="minor">
-              <a:schemeClr val="lt1"/>
-            </a:fontRef>
-          </p:style>
-          <p:txBody>
-            <a:bodyPr rtlCol="0" anchor="ctr"/>
-            <a:lstStyle/>
-            <a:p>
-              <a:pPr algn="ctr"/>
-              <a:endParaRPr lang="en-US">
-                <a:solidFill>
-                  <a:schemeClr val="tx1"/>
-                </a:solidFill>
-              </a:endParaRPr>
-            </a:p>
-          </p:txBody>
-        </p:sp>
-        <p:sp>
-          <p:nvSpPr>
-            <p:cNvPr id="12" name="Block Arc 11"/>
-            <p:cNvSpPr/>
-            <p:nvPr/>
-          </p:nvSpPr>
-          <p:spPr>
-            <a:xfrm flipV="1">
-              <a:off x="3125301" y="3163142"/>
-              <a:ext cx="1893436" cy="704033"/>
-            </a:xfrm>
-            <a:prstGeom prst="blockArc">
-              <a:avLst/>
-            </a:prstGeom>
-            <a:solidFill>
-              <a:schemeClr val="tx1"/>
-            </a:solidFill>
-            <a:ln>
-              <a:noFill/>
-            </a:ln>
-          </p:spPr>
-          <p:style>
-            <a:lnRef idx="1">
-              <a:schemeClr val="accent1"/>
-            </a:lnRef>
-            <a:fillRef idx="3">
-              <a:schemeClr val="accent1"/>
-            </a:fillRef>
-            <a:effectRef idx="2">
-              <a:schemeClr val="accent1"/>
-            </a:effectRef>
-            <a:fontRef idx="minor">
-              <a:schemeClr val="lt1"/>
-            </a:fontRef>
-          </p:style>
-          <p:txBody>
-            <a:bodyPr rtlCol="0" anchor="ctr"/>
-            <a:lstStyle/>
-            <a:p>
-              <a:pPr algn="ctr"/>
-              <a:endParaRPr lang="en-US">
-                <a:solidFill>
-                  <a:schemeClr val="tx1"/>
-                </a:solidFill>
-              </a:endParaRPr>
-            </a:p>
-          </p:txBody>
-        </p:sp>
-        <p:sp>
-          <p:nvSpPr>
-            <p:cNvPr id="17" name="Isosceles Triangle 16"/>
-            <p:cNvSpPr/>
-            <p:nvPr/>
-          </p:nvSpPr>
-          <p:spPr>
-            <a:xfrm rot="10800000">
-              <a:off x="3924464" y="4280677"/>
-              <a:ext cx="328227" cy="356722"/>
-            </a:xfrm>
-            <a:prstGeom prst="triangle">
-              <a:avLst/>
-            </a:prstGeom>
-            <a:solidFill>
-              <a:srgbClr val="000000"/>
-            </a:solidFill>
-            <a:ln>
-              <a:noFill/>
-            </a:ln>
-          </p:spPr>
-          <p:style>
-            <a:lnRef idx="1">
-              <a:schemeClr val="accent1"/>
-            </a:lnRef>
-            <a:fillRef idx="3">
-              <a:schemeClr val="accent1"/>
-            </a:fillRef>
-            <a:effectRef idx="2">
-              <a:schemeClr val="accent1"/>
-            </a:effectRef>
-            <a:fontRef idx="minor">
-              <a:schemeClr val="lt1"/>
-            </a:fontRef>
-          </p:style>
-          <p:txBody>
-            <a:bodyPr rtlCol="0" anchor="ctr"/>
-            <a:lstStyle/>
-            <a:p>
-              <a:pPr algn="ctr"/>
-              <a:endParaRPr lang="en-US"/>
-            </a:p>
-          </p:txBody>
-        </p:sp>
-        <p:sp>
-          <p:nvSpPr>
-            <p:cNvPr id="21" name="Trapezoid 20"/>
-            <p:cNvSpPr/>
-            <p:nvPr/>
-          </p:nvSpPr>
-          <p:spPr>
-            <a:xfrm>
-              <a:off x="3239467" y="1269933"/>
-              <a:ext cx="1598328" cy="456606"/>
-            </a:xfrm>
-            <a:prstGeom prst="trapezoid">
-              <a:avLst>
-                <a:gd name="adj" fmla="val 50003"/>
-              </a:avLst>
-            </a:prstGeom>
-            <a:solidFill>
-              <a:srgbClr val="000000"/>
-            </a:solidFill>
-            <a:ln>
-              <a:noFill/>
-            </a:ln>
-          </p:spPr>
-          <p:style>
-            <a:lnRef idx="1">
-              <a:schemeClr val="accent1"/>
-            </a:lnRef>
-            <a:fillRef idx="3">
-              <a:schemeClr val="accent1"/>
-            </a:fillRef>
-            <a:effectRef idx="2">
-              <a:schemeClr val="accent1"/>
-            </a:effectRef>
-            <a:fontRef idx="minor">
-              <a:schemeClr val="lt1"/>
-            </a:fontRef>
-          </p:style>
-          <p:txBody>
-            <a:bodyPr rtlCol="0" anchor="ctr"/>
-            <a:lstStyle/>
-            <a:p>
-              <a:pPr algn="ctr"/>
-              <a:endParaRPr lang="en-US"/>
-            </a:p>
-          </p:txBody>
-        </p:sp>
-        <p:sp>
-          <p:nvSpPr>
-            <p:cNvPr id="24" name="Oval 23"/>
-            <p:cNvSpPr/>
-            <p:nvPr/>
-          </p:nvSpPr>
-          <p:spPr>
-            <a:xfrm>
-              <a:off x="3524882" y="1269933"/>
-              <a:ext cx="456665" cy="513681"/>
-            </a:xfrm>
-            <a:prstGeom prst="ellipse">
-              <a:avLst/>
-            </a:prstGeom>
-            <a:solidFill>
-              <a:schemeClr val="bg1"/>
-            </a:solidFill>
-            <a:ln w="76200">
+            <a:ln w="76200" cmpd="sng">
               <a:solidFill>
-                <a:schemeClr val="tx1"/>
+                <a:srgbClr val="000000"/>
               </a:solidFill>
             </a:ln>
           </p:spPr>
           <p:style>
-            <a:lnRef idx="1">
+            <a:lnRef idx="2">
               <a:schemeClr val="accent1"/>
             </a:lnRef>
-            <a:fillRef idx="3">
+            <a:fillRef idx="0">
               <a:schemeClr val="accent1"/>
             </a:fillRef>
-            <a:effectRef idx="2">
+            <a:effectRef idx="1">
               <a:schemeClr val="accent1"/>
             </a:effectRef>
             <a:fontRef idx="minor">
-              <a:schemeClr val="lt1"/>
+              <a:schemeClr val="tx1"/>
             </a:fontRef>
           </p:style>
-          <p:txBody>
-            <a:bodyPr rtlCol="0" anchor="ctr"/>
-            <a:lstStyle/>
-            <a:p>
-              <a:pPr algn="ctr"/>
-              <a:endParaRPr lang="en-US"/>
-            </a:p>
-          </p:txBody>
-        </p:sp>
-        <p:sp>
-          <p:nvSpPr>
-            <p:cNvPr id="25" name="Oval 24"/>
-            <p:cNvSpPr/>
+        </p:cxnSp>
+        <p:pic>
+          <p:nvPicPr>
+            <p:cNvPr id="51" name="Picture 50"/>
+            <p:cNvPicPr>
+              <a:picLocks noChangeAspect="1"/>
+            </p:cNvPicPr>
             <p:nvPr/>
-          </p:nvSpPr>
+          </p:nvPicPr>
+          <p:blipFill>
+            <a:blip r:embed="rId2">
+              <a:extLst>
+                <a:ext uri="{BEBA8EAE-BF5A-486C-A8C5-ECC9F3942E4B}">
+                  <a14:imgProps xmlns:a14="http://schemas.microsoft.com/office/drawing/2010/main">
+                    <a14:imgLayer r:embed="rId3">
+                      <a14:imgEffect>
+                        <a14:backgroundRemoval t="0" b="98438" l="39167" r="62500"/>
+                      </a14:imgEffect>
+                    </a14:imgLayer>
+                  </a14:imgProps>
+                </a:ext>
+              </a:extLst>
+            </a:blip>
+            <a:stretch>
+              <a:fillRect/>
+            </a:stretch>
+          </p:blipFill>
           <p:spPr>
-            <a:xfrm>
-              <a:off x="3620198" y="1422333"/>
-              <a:ext cx="304265" cy="361281"/>
+            <a:xfrm rot="718801">
+              <a:off x="4226334" y="543881"/>
+              <a:ext cx="1999058" cy="2682354"/>
             </a:xfrm>
-            <a:prstGeom prst="ellipse">
+            <a:prstGeom prst="rect">
               <a:avLst/>
             </a:prstGeom>
-            <a:solidFill>
-              <a:schemeClr val="tx1"/>
-            </a:solidFill>
-            <a:ln w="76200">
-              <a:noFill/>
-            </a:ln>
           </p:spPr>
-          <p:style>
-            <a:lnRef idx="1">
-              <a:schemeClr val="accent1"/>
-            </a:lnRef>
-            <a:fillRef idx="3">
-              <a:schemeClr val="accent1"/>
-            </a:fillRef>
-            <a:effectRef idx="2">
-              <a:schemeClr val="accent1"/>
-            </a:effectRef>
-            <a:fontRef idx="minor">
-              <a:schemeClr val="lt1"/>
-            </a:fontRef>
-          </p:style>
-          <p:txBody>
-            <a:bodyPr rtlCol="0" anchor="ctr"/>
-            <a:lstStyle/>
-            <a:p>
-              <a:pPr algn="ctr"/>
-              <a:endParaRPr lang="en-US"/>
-            </a:p>
-          </p:txBody>
-        </p:sp>
-        <p:sp>
-          <p:nvSpPr>
-            <p:cNvPr id="26" name="Oval 25"/>
-            <p:cNvSpPr/>
-            <p:nvPr/>
-          </p:nvSpPr>
-          <p:spPr>
-            <a:xfrm>
-              <a:off x="4118504" y="1269933"/>
-              <a:ext cx="456665" cy="513681"/>
-            </a:xfrm>
-            <a:prstGeom prst="ellipse">
-              <a:avLst/>
-            </a:prstGeom>
-            <a:solidFill>
-              <a:schemeClr val="bg1"/>
-            </a:solidFill>
-            <a:ln w="76200">
-              <a:solidFill>
-                <a:schemeClr val="tx1"/>
-              </a:solidFill>
-            </a:ln>
-          </p:spPr>
-          <p:style>
-            <a:lnRef idx="1">
-              <a:schemeClr val="accent1"/>
-            </a:lnRef>
-            <a:fillRef idx="3">
-              <a:schemeClr val="accent1"/>
-            </a:fillRef>
-            <a:effectRef idx="2">
-              <a:schemeClr val="accent1"/>
-            </a:effectRef>
-            <a:fontRef idx="minor">
-              <a:schemeClr val="lt1"/>
-            </a:fontRef>
-          </p:style>
-          <p:txBody>
-            <a:bodyPr rtlCol="0" anchor="ctr"/>
-            <a:lstStyle/>
-            <a:p>
-              <a:pPr algn="ctr"/>
-              <a:endParaRPr lang="en-US"/>
-            </a:p>
-          </p:txBody>
-        </p:sp>
-        <p:sp>
-          <p:nvSpPr>
-            <p:cNvPr id="27" name="Oval 26"/>
-            <p:cNvSpPr/>
-            <p:nvPr/>
-          </p:nvSpPr>
-          <p:spPr>
-            <a:xfrm>
-              <a:off x="4213820" y="1422333"/>
-              <a:ext cx="304265" cy="361281"/>
-            </a:xfrm>
-            <a:prstGeom prst="ellipse">
-              <a:avLst/>
-            </a:prstGeom>
-            <a:solidFill>
-              <a:schemeClr val="tx1"/>
-            </a:solidFill>
-            <a:ln w="76200">
-              <a:noFill/>
-            </a:ln>
-          </p:spPr>
-          <p:style>
-            <a:lnRef idx="1">
-              <a:schemeClr val="accent1"/>
-            </a:lnRef>
-            <a:fillRef idx="3">
-              <a:schemeClr val="accent1"/>
-            </a:fillRef>
-            <a:effectRef idx="2">
-              <a:schemeClr val="accent1"/>
-            </a:effectRef>
-            <a:fontRef idx="minor">
-              <a:schemeClr val="lt1"/>
-            </a:fontRef>
-          </p:style>
-          <p:txBody>
-            <a:bodyPr rtlCol="0" anchor="ctr"/>
-            <a:lstStyle/>
-            <a:p>
-              <a:pPr algn="ctr"/>
-              <a:endParaRPr lang="en-US"/>
-            </a:p>
-          </p:txBody>
-        </p:sp>
+        </p:pic>
       </p:grpSp>
-      <p:sp>
-        <p:nvSpPr>
-          <p:cNvPr id="28" name="Heart 27"/>
-          <p:cNvSpPr/>
-          <p:nvPr/>
-        </p:nvSpPr>
-        <p:spPr>
-          <a:xfrm rot="16200000">
-            <a:off x="6087342" y="3151009"/>
-            <a:ext cx="3353633" cy="847726"/>
-          </a:xfrm>
-          <a:prstGeom prst="heart">
-            <a:avLst/>
-          </a:prstGeom>
-          <a:solidFill>
-            <a:schemeClr val="bg1">
-              <a:lumMod val="85000"/>
-            </a:schemeClr>
-          </a:solidFill>
-          <a:ln>
-            <a:solidFill>
-              <a:schemeClr val="tx1"/>
-            </a:solidFill>
-          </a:ln>
-        </p:spPr>
-        <p:style>
-          <a:lnRef idx="1">
-            <a:schemeClr val="accent1"/>
-          </a:lnRef>
-          <a:fillRef idx="3">
-            <a:schemeClr val="accent1"/>
-          </a:fillRef>
-          <a:effectRef idx="2">
-            <a:schemeClr val="accent1"/>
-          </a:effectRef>
-          <a:fontRef idx="minor">
-            <a:schemeClr val="lt1"/>
-          </a:fontRef>
-        </p:style>
-        <p:txBody>
-          <a:bodyPr rtlCol="0" anchor="ctr"/>
-          <a:lstStyle/>
-          <a:p>
-            <a:pPr algn="ctr"/>
-            <a:endParaRPr lang="en-US"/>
-          </a:p>
-        </p:txBody>
-      </p:sp>
-      <p:sp>
-        <p:nvSpPr>
-          <p:cNvPr id="29" name="Heart 28"/>
-          <p:cNvSpPr/>
-          <p:nvPr/>
-        </p:nvSpPr>
-        <p:spPr>
-          <a:xfrm rot="5400000">
-            <a:off x="7218994" y="3022588"/>
-            <a:ext cx="3353633" cy="847726"/>
-          </a:xfrm>
-          <a:prstGeom prst="heart">
-            <a:avLst/>
-          </a:prstGeom>
-          <a:solidFill>
-            <a:schemeClr val="bg1">
-              <a:lumMod val="85000"/>
-            </a:schemeClr>
-          </a:solidFill>
-          <a:ln>
-            <a:solidFill>
-              <a:schemeClr val="tx1"/>
-            </a:solidFill>
-          </a:ln>
-        </p:spPr>
-        <p:style>
-          <a:lnRef idx="1">
-            <a:schemeClr val="accent1"/>
-          </a:lnRef>
-          <a:fillRef idx="3">
-            <a:schemeClr val="accent1"/>
-          </a:fillRef>
-          <a:effectRef idx="2">
-            <a:schemeClr val="accent1"/>
-          </a:effectRef>
-          <a:fontRef idx="minor">
-            <a:schemeClr val="lt1"/>
-          </a:fontRef>
-        </p:style>
-        <p:txBody>
-          <a:bodyPr rtlCol="0" anchor="ctr"/>
-          <a:lstStyle/>
-          <a:p>
-            <a:pPr algn="ctr"/>
-            <a:endParaRPr lang="en-US"/>
-          </a:p>
-        </p:txBody>
-      </p:sp>
     </p:spTree>
     <p:extLst>
       <p:ext uri="{BB962C8B-B14F-4D97-AF65-F5344CB8AC3E}">
@@ -3927,6 +4155,13 @@
   <p:clrMapOvr>
     <a:masterClrMapping/>
   </p:clrMapOvr>
+  <p:timing>
+    <p:tnLst>
+      <p:par>
+        <p:cTn xmlns:p14="http://schemas.microsoft.com/office/powerpoint/2010/main" id="1" dur="indefinite" restart="never" nodeType="tmRoot"/>
+      </p:par>
+    </p:tnLst>
+  </p:timing>
 </p:sld>
 </file>
 

</xml_diff>